<commit_message>
get coding with me  - edit JavaScript resource (dev. env. setup)
</commit_message>
<xml_diff>
--- a/30/200727_JavaScript_DevEnv.pptx
+++ b/30/200727_JavaScript_DevEnv.pptx
@@ -5,10 +5,10 @@
     <p:sldMasterId id="2147483672" r:id="rId1"/>
   </p:sldMasterIdLst>
   <p:notesMasterIdLst>
-    <p:notesMasterId r:id="rId23"/>
+    <p:notesMasterId r:id="rId24"/>
   </p:notesMasterIdLst>
   <p:handoutMasterIdLst>
-    <p:handoutMasterId r:id="rId24"/>
+    <p:handoutMasterId r:id="rId25"/>
   </p:handoutMasterIdLst>
   <p:sldIdLst>
     <p:sldId id="357" r:id="rId2"/>
@@ -32,30 +32,31 @@
     <p:sldId id="545" r:id="rId20"/>
     <p:sldId id="546" r:id="rId21"/>
     <p:sldId id="547" r:id="rId22"/>
+    <p:sldId id="548" r:id="rId23"/>
   </p:sldIdLst>
   <p:sldSz cx="10160000" cy="5715000"/>
   <p:notesSz cx="9996488" cy="6865938"/>
   <p:embeddedFontLst>
     <p:embeddedFont>
-      <p:font typeface="Calibri" pitchFamily="34" charset="0"/>
-      <p:regular r:id="rId25"/>
-      <p:bold r:id="rId26"/>
-      <p:italic r:id="rId27"/>
-      <p:boldItalic r:id="rId28"/>
+      <p:font typeface="맑은 고딕 Semilight" panose="020B0502040204020203" pitchFamily="50" charset="-127"/>
+      <p:regular r:id="rId26"/>
     </p:embeddedFont>
     <p:embeddedFont>
-      <p:font typeface="Calibri Light" charset="0"/>
+      <p:font typeface="맑은 고딕" panose="020B0503020000020004" pitchFamily="50" charset="-127"/>
+      <p:regular r:id="rId27"/>
+      <p:bold r:id="rId28"/>
+    </p:embeddedFont>
+    <p:embeddedFont>
+      <p:font typeface="Calibri Light" panose="020F0302020204030204" pitchFamily="34" charset="0"/>
       <p:regular r:id="rId29"/>
       <p:italic r:id="rId30"/>
     </p:embeddedFont>
     <p:embeddedFont>
-      <p:font typeface="맑은 고딕 Semilight" charset="-127"/>
+      <p:font typeface="Calibri" panose="020F0502020204030204" pitchFamily="34" charset="0"/>
       <p:regular r:id="rId31"/>
-    </p:embeddedFont>
-    <p:embeddedFont>
-      <p:font typeface="맑은 고딕" pitchFamily="50" charset="-127"/>
-      <p:regular r:id="rId32"/>
-      <p:bold r:id="rId33"/>
+      <p:bold r:id="rId32"/>
+      <p:italic r:id="rId33"/>
+      <p:boldItalic r:id="rId34"/>
     </p:embeddedFont>
   </p:embeddedFontLst>
   <p:defaultTextStyle>
@@ -155,7 +156,18 @@
   </p:defaultTextStyle>
   <p:extLst>
     <p:ext uri="{EFAFB233-063F-42B5-8137-9DF3F51BA10A}">
-      <p15:sldGuideLst xmlns:p15="http://schemas.microsoft.com/office/powerpoint/2012/main" xmlns=""/>
+      <p15:sldGuideLst xmlns:p15="http://schemas.microsoft.com/office/powerpoint/2012/main">
+        <p15:guide id="1" orient="horz" pos="1800">
+          <p15:clr>
+            <a:srgbClr val="A4A3A4"/>
+          </p15:clr>
+        </p15:guide>
+        <p15:guide id="2" pos="3200">
+          <p15:clr>
+            <a:srgbClr val="A4A3A4"/>
+          </p15:clr>
+        </p15:guide>
+      </p15:sldGuideLst>
     </p:ext>
   </p:extLst>
 </p:presentation>
@@ -243,7 +255,7 @@
           <a:p>
             <a:fld id="{9FE52F76-AF59-42F6-9CE2-B65810388E55}" type="datetimeFigureOut">
               <a:rPr lang="ko-KR" altLang="en-US" smtClean="0"/>
-              <a:t>2020-08-12</a:t>
+              <a:t>2020-08-18</a:t>
             </a:fld>
             <a:endParaRPr lang="ko-KR" altLang="en-US"/>
           </a:p>
@@ -408,7 +420,7 @@
           <a:p>
             <a:fld id="{75C19CB4-4756-4824-8E84-477C40131107}" type="datetimeFigureOut">
               <a:rPr lang="ko-KR" altLang="en-US" smtClean="0"/>
-              <a:t>2020-08-12</a:t>
+              <a:t>2020-08-18</a:t>
             </a:fld>
             <a:endParaRPr lang="ko-KR" altLang="en-US"/>
           </a:p>
@@ -1993,6 +2005,107 @@
 </p:notes>
 </file>
 
+<file path=ppt/notesSlides/notesSlide21.xml><?xml version="1.0" encoding="utf-8"?>
+<p:notes xmlns:a="http://schemas.openxmlformats.org/drawingml/2006/main" xmlns:r="http://schemas.openxmlformats.org/officeDocument/2006/relationships" xmlns:p="http://schemas.openxmlformats.org/presentationml/2006/main">
+  <p:cSld>
+    <p:spTree>
+      <p:nvGrpSpPr>
+        <p:cNvPr id="1" name=""/>
+        <p:cNvGrpSpPr/>
+        <p:nvPr/>
+      </p:nvGrpSpPr>
+      <p:grpSpPr>
+        <a:xfrm>
+          <a:off x="0" y="0"/>
+          <a:ext cx="0" cy="0"/>
+          <a:chOff x="0" y="0"/>
+          <a:chExt cx="0" cy="0"/>
+        </a:xfrm>
+      </p:grpSpPr>
+      <p:sp>
+        <p:nvSpPr>
+          <p:cNvPr id="2" name="슬라이드 이미지 개체 틀 1"/>
+          <p:cNvSpPr>
+            <a:spLocks noGrp="1" noRot="1" noChangeAspect="1"/>
+          </p:cNvSpPr>
+          <p:nvPr>
+            <p:ph type="sldImg"/>
+          </p:nvPr>
+        </p:nvSpPr>
+        <p:spPr/>
+      </p:sp>
+      <p:sp>
+        <p:nvSpPr>
+          <p:cNvPr id="3" name="슬라이드 노트 개체 틀 2"/>
+          <p:cNvSpPr>
+            <a:spLocks noGrp="1"/>
+          </p:cNvSpPr>
+          <p:nvPr>
+            <p:ph type="body" idx="1"/>
+          </p:nvPr>
+        </p:nvSpPr>
+        <p:spPr/>
+        <p:txBody>
+          <a:bodyPr/>
+          <a:lstStyle/>
+          <a:p>
+            <a:pPr marL="0" marR="0" indent="0" algn="l" defTabSz="914400" rtl="0" eaLnBrk="1" fontAlgn="auto" latinLnBrk="1" hangingPunct="1">
+              <a:lnSpc>
+                <a:spcPct val="100000"/>
+              </a:lnSpc>
+              <a:spcBef>
+                <a:spcPts val="0"/>
+              </a:spcBef>
+              <a:spcAft>
+                <a:spcPts val="0"/>
+              </a:spcAft>
+              <a:buClrTx/>
+              <a:buSzTx/>
+              <a:buFontTx/>
+              <a:buNone/>
+              <a:tabLst/>
+              <a:defRPr/>
+            </a:pPr>
+            <a:endParaRPr lang="ko-KR" altLang="en-US" dirty="0"/>
+          </a:p>
+        </p:txBody>
+      </p:sp>
+      <p:sp>
+        <p:nvSpPr>
+          <p:cNvPr id="4" name="슬라이드 번호 개체 틀 3"/>
+          <p:cNvSpPr>
+            <a:spLocks noGrp="1"/>
+          </p:cNvSpPr>
+          <p:nvPr>
+            <p:ph type="sldNum" sz="quarter" idx="10"/>
+          </p:nvPr>
+        </p:nvSpPr>
+        <p:spPr/>
+        <p:txBody>
+          <a:bodyPr/>
+          <a:lstStyle/>
+          <a:p>
+            <a:fld id="{A6D625BF-EF7C-4F5D-B58E-C92BFFBBF146}" type="slidenum">
+              <a:rPr lang="ko-KR" altLang="en-US" smtClean="0"/>
+              <a:t>22</a:t>
+            </a:fld>
+            <a:endParaRPr lang="ko-KR" altLang="en-US"/>
+          </a:p>
+        </p:txBody>
+      </p:sp>
+    </p:spTree>
+    <p:extLst>
+      <p:ext uri="{BB962C8B-B14F-4D97-AF65-F5344CB8AC3E}">
+        <p14:creationId xmlns:p14="http://schemas.microsoft.com/office/powerpoint/2010/main" val="1977016297"/>
+      </p:ext>
+    </p:extLst>
+  </p:cSld>
+  <p:clrMapOvr>
+    <a:masterClrMapping/>
+  </p:clrMapOvr>
+</p:notes>
+</file>
+
 <file path=ppt/notesSlides/notesSlide3.xml><?xml version="1.0" encoding="utf-8"?>
 <p:notes xmlns:a="http://schemas.openxmlformats.org/drawingml/2006/main" xmlns:r="http://schemas.openxmlformats.org/officeDocument/2006/relationships" xmlns:p="http://schemas.openxmlformats.org/presentationml/2006/main">
   <p:cSld>
@@ -2869,7 +2982,7 @@
           <a:p>
             <a:fld id="{D9D21D2B-B161-4A2C-A0F2-324F8DD03E7E}" type="datetimeFigureOut">
               <a:rPr lang="ko-KR" altLang="en-US" smtClean="0"/>
-              <a:t>2020-08-12</a:t>
+              <a:t>2020-08-18</a:t>
             </a:fld>
             <a:endParaRPr lang="ko-KR" altLang="en-US"/>
           </a:p>
@@ -3076,7 +3189,7 @@
           <a:p>
             <a:fld id="{D9D21D2B-B161-4A2C-A0F2-324F8DD03E7E}" type="datetimeFigureOut">
               <a:rPr lang="ko-KR" altLang="en-US" smtClean="0"/>
-              <a:t>2020-08-12</a:t>
+              <a:t>2020-08-18</a:t>
             </a:fld>
             <a:endParaRPr lang="ko-KR" altLang="en-US"/>
           </a:p>
@@ -3256,7 +3369,7 @@
           <a:p>
             <a:fld id="{D9D21D2B-B161-4A2C-A0F2-324F8DD03E7E}" type="datetimeFigureOut">
               <a:rPr lang="ko-KR" altLang="en-US" smtClean="0"/>
-              <a:t>2020-08-12</a:t>
+              <a:t>2020-08-18</a:t>
             </a:fld>
             <a:endParaRPr lang="ko-KR" altLang="en-US"/>
           </a:p>
@@ -3426,7 +3539,7 @@
           <a:p>
             <a:fld id="{D9D21D2B-B161-4A2C-A0F2-324F8DD03E7E}" type="datetimeFigureOut">
               <a:rPr lang="ko-KR" altLang="en-US" smtClean="0"/>
-              <a:t>2020-08-12</a:t>
+              <a:t>2020-08-18</a:t>
             </a:fld>
             <a:endParaRPr lang="ko-KR" altLang="en-US"/>
           </a:p>
@@ -3679,7 +3792,7 @@
           <a:p>
             <a:fld id="{D9D21D2B-B161-4A2C-A0F2-324F8DD03E7E}" type="datetimeFigureOut">
               <a:rPr lang="ko-KR" altLang="en-US" smtClean="0"/>
-              <a:t>2020-08-12</a:t>
+              <a:t>2020-08-18</a:t>
             </a:fld>
             <a:endParaRPr lang="ko-KR" altLang="en-US"/>
           </a:p>
@@ -3918,7 +4031,7 @@
           <a:p>
             <a:fld id="{D9D21D2B-B161-4A2C-A0F2-324F8DD03E7E}" type="datetimeFigureOut">
               <a:rPr lang="ko-KR" altLang="en-US" smtClean="0"/>
-              <a:t>2020-08-12</a:t>
+              <a:t>2020-08-18</a:t>
             </a:fld>
             <a:endParaRPr lang="ko-KR" altLang="en-US"/>
           </a:p>
@@ -4292,7 +4405,7 @@
           <a:p>
             <a:fld id="{D9D21D2B-B161-4A2C-A0F2-324F8DD03E7E}" type="datetimeFigureOut">
               <a:rPr lang="ko-KR" altLang="en-US" smtClean="0"/>
-              <a:t>2020-08-12</a:t>
+              <a:t>2020-08-18</a:t>
             </a:fld>
             <a:endParaRPr lang="ko-KR" altLang="en-US"/>
           </a:p>
@@ -4410,7 +4523,7 @@
           <a:p>
             <a:fld id="{D9D21D2B-B161-4A2C-A0F2-324F8DD03E7E}" type="datetimeFigureOut">
               <a:rPr lang="ko-KR" altLang="en-US" smtClean="0"/>
-              <a:t>2020-08-12</a:t>
+              <a:t>2020-08-18</a:t>
             </a:fld>
             <a:endParaRPr lang="ko-KR" altLang="en-US"/>
           </a:p>
@@ -4505,7 +4618,7 @@
           <a:p>
             <a:fld id="{D9D21D2B-B161-4A2C-A0F2-324F8DD03E7E}" type="datetimeFigureOut">
               <a:rPr lang="ko-KR" altLang="en-US" smtClean="0"/>
-              <a:t>2020-08-12</a:t>
+              <a:t>2020-08-18</a:t>
             </a:fld>
             <a:endParaRPr lang="ko-KR" altLang="en-US"/>
           </a:p>
@@ -4782,7 +4895,7 @@
           <a:p>
             <a:fld id="{D9D21D2B-B161-4A2C-A0F2-324F8DD03E7E}" type="datetimeFigureOut">
               <a:rPr lang="ko-KR" altLang="en-US" smtClean="0"/>
-              <a:t>2020-08-12</a:t>
+              <a:t>2020-08-18</a:t>
             </a:fld>
             <a:endParaRPr lang="ko-KR" altLang="en-US"/>
           </a:p>
@@ -5039,7 +5152,7 @@
           <a:p>
             <a:fld id="{D9D21D2B-B161-4A2C-A0F2-324F8DD03E7E}" type="datetimeFigureOut">
               <a:rPr lang="ko-KR" altLang="en-US" smtClean="0"/>
-              <a:t>2020-08-12</a:t>
+              <a:t>2020-08-18</a:t>
             </a:fld>
             <a:endParaRPr lang="ko-KR" altLang="en-US"/>
           </a:p>
@@ -5255,7 +5368,7 @@
           <a:p>
             <a:fld id="{D9D21D2B-B161-4A2C-A0F2-324F8DD03E7E}" type="datetimeFigureOut">
               <a:rPr lang="ko-KR" altLang="en-US" smtClean="0"/>
-              <a:t>2020-08-12</a:t>
+              <a:t>2020-08-18</a:t>
             </a:fld>
             <a:endParaRPr lang="ko-KR" altLang="en-US"/>
           </a:p>
@@ -6241,37 +6354,7 @@
                 <a:cs typeface="맑은 고딕 Semilight" panose="020B0502040204020203" pitchFamily="50" charset="-127"/>
                 <a:sym typeface="Wingdings" panose="05000000000000000000" pitchFamily="2" charset="2"/>
               </a:rPr>
-              <a:t>.</a:t>
-            </a:r>
-            <a:r>
-              <a:rPr lang="en-US" altLang="ko-KR" sz="1400" dirty="0" smtClean="0">
-                <a:ln>
-                  <a:solidFill>
-                    <a:schemeClr val="tx1">
-                      <a:alpha val="29000"/>
-                    </a:schemeClr>
-                  </a:solidFill>
-                </a:ln>
-                <a:latin typeface="+mn-ea"/>
-                <a:cs typeface="맑은 고딕 Semilight" panose="020B0502040204020203" pitchFamily="50" charset="-127"/>
-                <a:sym typeface="Wingdings" panose="05000000000000000000" pitchFamily="2" charset="2"/>
-              </a:rPr>
-              <a:t>html</a:t>
-            </a:r>
-            <a:r>
-              <a:rPr lang="en-US" altLang="ko-KR" sz="1400" dirty="0" smtClean="0">
-                <a:ln>
-                  <a:solidFill>
-                    <a:schemeClr val="tx1">
-                      <a:alpha val="29000"/>
-                    </a:schemeClr>
-                  </a:solidFill>
-                </a:ln>
-                <a:latin typeface="+mn-ea"/>
-                <a:cs typeface="맑은 고딕 Semilight" panose="020B0502040204020203" pitchFamily="50" charset="-127"/>
-                <a:sym typeface="Wingdings" panose="05000000000000000000" pitchFamily="2" charset="2"/>
-              </a:rPr>
-              <a:t> </a:t>
+              <a:t>.html </a:t>
             </a:r>
             <a:r>
               <a:rPr lang="ko-KR" altLang="en-US" sz="1400" dirty="0" smtClean="0">
@@ -6345,22 +6428,7 @@
                 <a:cs typeface="맑은 고딕 Semilight" panose="020B0502040204020203" pitchFamily="50" charset="-127"/>
                 <a:sym typeface="Wingdings" panose="05000000000000000000" pitchFamily="2" charset="2"/>
               </a:rPr>
-              <a:t>파일을 생성하고 </a:t>
-            </a:r>
-            <a:r>
-              <a:rPr lang="ko-KR" altLang="en-US" sz="1400" dirty="0" smtClean="0">
-                <a:ln>
-                  <a:solidFill>
-                    <a:schemeClr val="tx1">
-                      <a:alpha val="29000"/>
-                    </a:schemeClr>
-                  </a:solidFill>
-                </a:ln>
-                <a:latin typeface="+mn-ea"/>
-                <a:cs typeface="맑은 고딕 Semilight" panose="020B0502040204020203" pitchFamily="50" charset="-127"/>
-                <a:sym typeface="Wingdings" panose="05000000000000000000" pitchFamily="2" charset="2"/>
-              </a:rPr>
-              <a:t>파일에 </a:t>
+              <a:t>파일을 생성하고 파일에 </a:t>
             </a:r>
             <a:r>
               <a:rPr lang="en-US" altLang="ko-KR" sz="1400" dirty="0" smtClean="0">
@@ -6793,37 +6861,7 @@
                 <a:cs typeface="맑은 고딕 Semilight" panose="020B0502040204020203" pitchFamily="50" charset="-127"/>
                 <a:sym typeface="Wingdings" panose="05000000000000000000" pitchFamily="2" charset="2"/>
               </a:rPr>
-              <a:t>.</a:t>
-            </a:r>
-            <a:r>
-              <a:rPr lang="en-US" altLang="ko-KR" sz="1400" dirty="0" smtClean="0">
-                <a:ln>
-                  <a:solidFill>
-                    <a:schemeClr val="tx1">
-                      <a:alpha val="29000"/>
-                    </a:schemeClr>
-                  </a:solidFill>
-                </a:ln>
-                <a:latin typeface="+mn-ea"/>
-                <a:cs typeface="맑은 고딕 Semilight" panose="020B0502040204020203" pitchFamily="50" charset="-127"/>
-                <a:sym typeface="Wingdings" panose="05000000000000000000" pitchFamily="2" charset="2"/>
-              </a:rPr>
-              <a:t>html</a:t>
-            </a:r>
-            <a:r>
-              <a:rPr lang="en-US" altLang="ko-KR" sz="1400" dirty="0" smtClean="0">
-                <a:ln>
-                  <a:solidFill>
-                    <a:schemeClr val="tx1">
-                      <a:alpha val="29000"/>
-                    </a:schemeClr>
-                  </a:solidFill>
-                </a:ln>
-                <a:latin typeface="+mn-ea"/>
-                <a:cs typeface="맑은 고딕 Semilight" panose="020B0502040204020203" pitchFamily="50" charset="-127"/>
-                <a:sym typeface="Wingdings" panose="05000000000000000000" pitchFamily="2" charset="2"/>
-              </a:rPr>
-              <a:t> </a:t>
+              <a:t>.html </a:t>
             </a:r>
             <a:r>
               <a:rPr lang="ko-KR" altLang="en-US" sz="1400" dirty="0" smtClean="0">
@@ -12256,6 +12294,534 @@
 </p:sld>
 </file>
 
+<file path=ppt/slides/slide22.xml><?xml version="1.0" encoding="utf-8"?>
+<p:sld xmlns:a="http://schemas.openxmlformats.org/drawingml/2006/main" xmlns:r="http://schemas.openxmlformats.org/officeDocument/2006/relationships" xmlns:p="http://schemas.openxmlformats.org/presentationml/2006/main">
+  <p:cSld>
+    <p:spTree>
+      <p:nvGrpSpPr>
+        <p:cNvPr id="1" name=""/>
+        <p:cNvGrpSpPr/>
+        <p:nvPr/>
+      </p:nvGrpSpPr>
+      <p:grpSpPr>
+        <a:xfrm>
+          <a:off x="0" y="0"/>
+          <a:ext cx="0" cy="0"/>
+          <a:chOff x="0" y="0"/>
+          <a:chExt cx="0" cy="0"/>
+        </a:xfrm>
+      </p:grpSpPr>
+      <p:cxnSp>
+        <p:nvCxnSpPr>
+          <p:cNvPr id="7" name="직선 연결선 6"/>
+          <p:cNvCxnSpPr/>
+          <p:nvPr/>
+        </p:nvCxnSpPr>
+        <p:spPr>
+          <a:xfrm>
+            <a:off x="0" y="683316"/>
+            <a:ext cx="3018263" cy="0"/>
+          </a:xfrm>
+          <a:prstGeom prst="line">
+            <a:avLst/>
+          </a:prstGeom>
+          <a:ln w="28575">
+            <a:solidFill>
+              <a:srgbClr val="ED553B"/>
+            </a:solidFill>
+            <a:tailEnd type="oval" w="lg" len="lg"/>
+          </a:ln>
+        </p:spPr>
+        <p:style>
+          <a:lnRef idx="1">
+            <a:schemeClr val="accent1"/>
+          </a:lnRef>
+          <a:fillRef idx="0">
+            <a:schemeClr val="accent1"/>
+          </a:fillRef>
+          <a:effectRef idx="0">
+            <a:schemeClr val="accent1"/>
+          </a:effectRef>
+          <a:fontRef idx="minor">
+            <a:schemeClr val="tx1"/>
+          </a:fontRef>
+        </p:style>
+      </p:cxnSp>
+      <p:sp>
+        <p:nvSpPr>
+          <p:cNvPr id="9" name="TextBox 8"/>
+          <p:cNvSpPr txBox="1"/>
+          <p:nvPr/>
+        </p:nvSpPr>
+        <p:spPr>
+          <a:xfrm>
+            <a:off x="322413" y="140957"/>
+            <a:ext cx="5552787" cy="400110"/>
+          </a:xfrm>
+          <a:prstGeom prst="rect">
+            <a:avLst/>
+          </a:prstGeom>
+          <a:noFill/>
+        </p:spPr>
+        <p:txBody>
+          <a:bodyPr wrap="square" rtlCol="0">
+            <a:spAutoFit/>
+          </a:bodyPr>
+          <a:lstStyle/>
+          <a:p>
+            <a:r>
+              <a:rPr lang="en-US" altLang="ko-KR" sz="2000" smtClean="0">
+                <a:ln>
+                  <a:solidFill>
+                    <a:schemeClr val="tx1">
+                      <a:alpha val="29000"/>
+                    </a:schemeClr>
+                  </a:solidFill>
+                </a:ln>
+                <a:latin typeface="+mn-ea"/>
+                <a:cs typeface="맑은 고딕 Semilight" panose="020B0502040204020203" pitchFamily="50" charset="-127"/>
+              </a:rPr>
+              <a:t>JavaScript </a:t>
+            </a:r>
+            <a:r>
+              <a:rPr lang="ko-KR" altLang="en-US" sz="2000" smtClean="0">
+                <a:ln>
+                  <a:solidFill>
+                    <a:schemeClr val="tx1">
+                      <a:alpha val="29000"/>
+                    </a:schemeClr>
+                  </a:solidFill>
+                </a:ln>
+                <a:latin typeface="+mn-ea"/>
+                <a:cs typeface="맑은 고딕 Semilight" panose="020B0502040204020203" pitchFamily="50" charset="-127"/>
+              </a:rPr>
+              <a:t>개발환경</a:t>
+            </a:r>
+            <a:endParaRPr lang="en-US" altLang="ko-KR" sz="2000" dirty="0">
+              <a:ln>
+                <a:solidFill>
+                  <a:schemeClr val="tx1">
+                    <a:alpha val="29000"/>
+                  </a:schemeClr>
+                </a:solidFill>
+              </a:ln>
+              <a:latin typeface="+mn-ea"/>
+              <a:cs typeface="맑은 고딕 Semilight" panose="020B0502040204020203" pitchFamily="50" charset="-127"/>
+            </a:endParaRPr>
+          </a:p>
+        </p:txBody>
+      </p:sp>
+      <p:sp>
+        <p:nvSpPr>
+          <p:cNvPr id="74" name="TextBox 73"/>
+          <p:cNvSpPr txBox="1"/>
+          <p:nvPr/>
+        </p:nvSpPr>
+        <p:spPr>
+          <a:xfrm>
+            <a:off x="267600" y="825566"/>
+            <a:ext cx="9657450" cy="830997"/>
+          </a:xfrm>
+          <a:prstGeom prst="rect">
+            <a:avLst/>
+          </a:prstGeom>
+          <a:noFill/>
+        </p:spPr>
+        <p:txBody>
+          <a:bodyPr wrap="square" rtlCol="0">
+            <a:spAutoFit/>
+          </a:bodyPr>
+          <a:lstStyle/>
+          <a:p>
+            <a:pPr marL="285750" indent="-285750">
+              <a:lnSpc>
+                <a:spcPct val="150000"/>
+              </a:lnSpc>
+              <a:buFont typeface="Arial" panose="020B0604020202020204" pitchFamily="34" charset="0"/>
+              <a:buChar char="•"/>
+            </a:pPr>
+            <a:r>
+              <a:rPr lang="en-US" altLang="ko-KR" sz="1800" dirty="0" smtClean="0">
+                <a:ln>
+                  <a:solidFill>
+                    <a:schemeClr val="tx1">
+                      <a:alpha val="29000"/>
+                    </a:schemeClr>
+                  </a:solidFill>
+                </a:ln>
+                <a:latin typeface="+mn-ea"/>
+                <a:cs typeface="맑은 고딕 Semilight" panose="020B0502040204020203" pitchFamily="50" charset="-127"/>
+                <a:sym typeface="Wingdings" panose="05000000000000000000" pitchFamily="2" charset="2"/>
+              </a:rPr>
+              <a:t>VS code</a:t>
+            </a:r>
+            <a:r>
+              <a:rPr lang="ko-KR" altLang="en-US" sz="1800" dirty="0" smtClean="0">
+                <a:ln>
+                  <a:solidFill>
+                    <a:schemeClr val="tx1">
+                      <a:alpha val="29000"/>
+                    </a:schemeClr>
+                  </a:solidFill>
+                </a:ln>
+                <a:latin typeface="+mn-ea"/>
+                <a:cs typeface="맑은 고딕 Semilight" panose="020B0502040204020203" pitchFamily="50" charset="-127"/>
+                <a:sym typeface="Wingdings" panose="05000000000000000000" pitchFamily="2" charset="2"/>
+              </a:rPr>
+              <a:t>와 </a:t>
+            </a:r>
+            <a:r>
+              <a:rPr lang="en-US" altLang="ko-KR" sz="1800" dirty="0" smtClean="0">
+                <a:ln>
+                  <a:solidFill>
+                    <a:schemeClr val="tx1">
+                      <a:alpha val="29000"/>
+                    </a:schemeClr>
+                  </a:solidFill>
+                </a:ln>
+                <a:latin typeface="+mn-ea"/>
+                <a:cs typeface="맑은 고딕 Semilight" panose="020B0502040204020203" pitchFamily="50" charset="-127"/>
+                <a:sym typeface="Wingdings" panose="05000000000000000000" pitchFamily="2" charset="2"/>
+              </a:rPr>
+              <a:t>local web</a:t>
+            </a:r>
+            <a:r>
+              <a:rPr lang="ko-KR" altLang="en-US" sz="1800" dirty="0" smtClean="0">
+                <a:ln>
+                  <a:solidFill>
+                    <a:schemeClr val="tx1">
+                      <a:alpha val="29000"/>
+                    </a:schemeClr>
+                  </a:solidFill>
+                </a:ln>
+                <a:latin typeface="+mn-ea"/>
+                <a:cs typeface="맑은 고딕 Semilight" panose="020B0502040204020203" pitchFamily="50" charset="-127"/>
+                <a:sym typeface="Wingdings" panose="05000000000000000000" pitchFamily="2" charset="2"/>
+              </a:rPr>
+              <a:t> </a:t>
+            </a:r>
+            <a:r>
+              <a:rPr lang="en-US" altLang="ko-KR" sz="1800" dirty="0" smtClean="0">
+                <a:ln>
+                  <a:solidFill>
+                    <a:schemeClr val="tx1">
+                      <a:alpha val="29000"/>
+                    </a:schemeClr>
+                  </a:solidFill>
+                </a:ln>
+                <a:latin typeface="+mn-ea"/>
+                <a:cs typeface="맑은 고딕 Semilight" panose="020B0502040204020203" pitchFamily="50" charset="-127"/>
+                <a:sym typeface="Wingdings" panose="05000000000000000000" pitchFamily="2" charset="2"/>
+              </a:rPr>
+              <a:t>server</a:t>
+            </a:r>
+            <a:r>
+              <a:rPr lang="ko-KR" altLang="en-US" sz="1800" dirty="0" smtClean="0">
+                <a:ln>
+                  <a:solidFill>
+                    <a:schemeClr val="tx1">
+                      <a:alpha val="29000"/>
+                    </a:schemeClr>
+                  </a:solidFill>
+                </a:ln>
+                <a:latin typeface="+mn-ea"/>
+                <a:cs typeface="맑은 고딕 Semilight" panose="020B0502040204020203" pitchFamily="50" charset="-127"/>
+                <a:sym typeface="Wingdings" panose="05000000000000000000" pitchFamily="2" charset="2"/>
+              </a:rPr>
+              <a:t>를 사용한 개발 환경</a:t>
+            </a:r>
+            <a:endParaRPr lang="en-US" altLang="ko-KR" sz="1800" dirty="0">
+              <a:ln>
+                <a:solidFill>
+                  <a:schemeClr val="tx1">
+                    <a:alpha val="29000"/>
+                  </a:schemeClr>
+                </a:solidFill>
+              </a:ln>
+              <a:latin typeface="+mn-ea"/>
+              <a:cs typeface="맑은 고딕 Semilight" panose="020B0502040204020203" pitchFamily="50" charset="-127"/>
+              <a:sym typeface="Wingdings" panose="05000000000000000000" pitchFamily="2" charset="2"/>
+            </a:endParaRPr>
+          </a:p>
+          <a:p>
+            <a:pPr marL="449263" lvl="1" indent="-182563">
+              <a:lnSpc>
+                <a:spcPct val="150000"/>
+              </a:lnSpc>
+              <a:buFontTx/>
+              <a:buChar char="-"/>
+              <a:tabLst>
+                <a:tab pos="182563" algn="l"/>
+                <a:tab pos="449263" algn="l"/>
+              </a:tabLst>
+            </a:pPr>
+            <a:r>
+              <a:rPr lang="en-US" altLang="ko-KR" sz="1400" dirty="0" smtClean="0">
+                <a:ln>
+                  <a:solidFill>
+                    <a:schemeClr val="tx1">
+                      <a:alpha val="29000"/>
+                    </a:schemeClr>
+                  </a:solidFill>
+                </a:ln>
+                <a:latin typeface="+mn-ea"/>
+                <a:cs typeface="맑은 고딕 Semilight" panose="020B0502040204020203" pitchFamily="50" charset="-127"/>
+                <a:sym typeface="Wingdings" panose="05000000000000000000" pitchFamily="2" charset="2"/>
+              </a:rPr>
+              <a:t>Windows</a:t>
+            </a:r>
+            <a:r>
+              <a:rPr lang="ko-KR" altLang="en-US" sz="1400" dirty="0" smtClean="0">
+                <a:ln>
+                  <a:solidFill>
+                    <a:schemeClr val="tx1">
+                      <a:alpha val="29000"/>
+                    </a:schemeClr>
+                  </a:solidFill>
+                </a:ln>
+                <a:latin typeface="+mn-ea"/>
+                <a:cs typeface="맑은 고딕 Semilight" panose="020B0502040204020203" pitchFamily="50" charset="-127"/>
+                <a:sym typeface="Wingdings" panose="05000000000000000000" pitchFamily="2" charset="2"/>
+              </a:rPr>
+              <a:t> </a:t>
+            </a:r>
+            <a:r>
+              <a:rPr lang="en-US" altLang="ko-KR" sz="1400" dirty="0" smtClean="0">
+                <a:ln>
+                  <a:solidFill>
+                    <a:schemeClr val="tx1">
+                      <a:alpha val="29000"/>
+                    </a:schemeClr>
+                  </a:solidFill>
+                </a:ln>
+                <a:latin typeface="+mn-ea"/>
+                <a:cs typeface="맑은 고딕 Semilight" panose="020B0502040204020203" pitchFamily="50" charset="-127"/>
+                <a:sym typeface="Wingdings" panose="05000000000000000000" pitchFamily="2" charset="2"/>
+              </a:rPr>
+              <a:t>10 MAMP preference setup</a:t>
+            </a:r>
+            <a:endParaRPr lang="en-US" altLang="ko-KR" sz="1400" dirty="0" smtClean="0">
+              <a:ln>
+                <a:solidFill>
+                  <a:schemeClr val="tx1">
+                    <a:alpha val="29000"/>
+                  </a:schemeClr>
+                </a:solidFill>
+              </a:ln>
+              <a:latin typeface="+mn-ea"/>
+              <a:cs typeface="맑은 고딕 Semilight" panose="020B0502040204020203" pitchFamily="50" charset="-127"/>
+              <a:sym typeface="Wingdings" panose="05000000000000000000" pitchFamily="2" charset="2"/>
+            </a:endParaRPr>
+          </a:p>
+        </p:txBody>
+      </p:sp>
+      <p:pic>
+        <p:nvPicPr>
+          <p:cNvPr id="2" name="그림 1"/>
+          <p:cNvPicPr>
+            <a:picLocks noChangeAspect="1"/>
+          </p:cNvPicPr>
+          <p:nvPr/>
+        </p:nvPicPr>
+        <p:blipFill>
+          <a:blip r:embed="rId3"/>
+          <a:stretch>
+            <a:fillRect/>
+          </a:stretch>
+        </p:blipFill>
+        <p:spPr>
+          <a:xfrm>
+            <a:off x="411363" y="2077876"/>
+            <a:ext cx="2749088" cy="2245734"/>
+          </a:xfrm>
+          <a:prstGeom prst="rect">
+            <a:avLst/>
+          </a:prstGeom>
+        </p:spPr>
+      </p:pic>
+      <p:pic>
+        <p:nvPicPr>
+          <p:cNvPr id="3" name="그림 2"/>
+          <p:cNvPicPr>
+            <a:picLocks noChangeAspect="1"/>
+          </p:cNvPicPr>
+          <p:nvPr/>
+        </p:nvPicPr>
+        <p:blipFill>
+          <a:blip r:embed="rId4"/>
+          <a:stretch>
+            <a:fillRect/>
+          </a:stretch>
+        </p:blipFill>
+        <p:spPr>
+          <a:xfrm>
+            <a:off x="3457052" y="2077876"/>
+            <a:ext cx="2750830" cy="2245734"/>
+          </a:xfrm>
+          <a:prstGeom prst="rect">
+            <a:avLst/>
+          </a:prstGeom>
+        </p:spPr>
+      </p:pic>
+      <p:pic>
+        <p:nvPicPr>
+          <p:cNvPr id="4" name="그림 3"/>
+          <p:cNvPicPr>
+            <a:picLocks noChangeAspect="1"/>
+          </p:cNvPicPr>
+          <p:nvPr/>
+        </p:nvPicPr>
+        <p:blipFill>
+          <a:blip r:embed="rId5"/>
+          <a:stretch>
+            <a:fillRect/>
+          </a:stretch>
+        </p:blipFill>
+        <p:spPr>
+          <a:xfrm>
+            <a:off x="6504483" y="2077876"/>
+            <a:ext cx="2746945" cy="2245734"/>
+          </a:xfrm>
+          <a:prstGeom prst="rect">
+            <a:avLst/>
+          </a:prstGeom>
+        </p:spPr>
+      </p:pic>
+      <p:sp>
+        <p:nvSpPr>
+          <p:cNvPr id="5" name="직사각형 4"/>
+          <p:cNvSpPr/>
+          <p:nvPr/>
+        </p:nvSpPr>
+        <p:spPr>
+          <a:xfrm>
+            <a:off x="5167155" y="4845498"/>
+            <a:ext cx="3142783" cy="292388"/>
+          </a:xfrm>
+          <a:prstGeom prst="rect">
+            <a:avLst/>
+          </a:prstGeom>
+        </p:spPr>
+        <p:txBody>
+          <a:bodyPr wrap="none">
+            <a:spAutoFit/>
+          </a:bodyPr>
+          <a:lstStyle/>
+          <a:p>
+            <a:r>
+              <a:rPr lang="ko-KR" altLang="en-US" sz="1300" dirty="0">
+                <a:ln>
+                  <a:solidFill>
+                    <a:schemeClr val="tx1">
+                      <a:alpha val="29000"/>
+                    </a:schemeClr>
+                  </a:solidFill>
+                </a:ln>
+                <a:latin typeface="+mn-ea"/>
+                <a:cs typeface="맑은 고딕 Semilight" panose="020B0502040204020203" pitchFamily="50" charset="-127"/>
+                <a:sym typeface="Wingdings" panose="05000000000000000000" pitchFamily="2" charset="2"/>
+              </a:rPr>
+              <a:t> </a:t>
+            </a:r>
+            <a:r>
+              <a:rPr lang="en-US" altLang="ko-KR" sz="1300" dirty="0" smtClean="0">
+                <a:ln>
+                  <a:solidFill>
+                    <a:schemeClr val="tx1">
+                      <a:alpha val="29000"/>
+                    </a:schemeClr>
+                  </a:solidFill>
+                </a:ln>
+                <a:latin typeface="+mn-ea"/>
+                <a:cs typeface="맑은 고딕 Semilight" panose="020B0502040204020203" pitchFamily="50" charset="-127"/>
+                <a:sym typeface="Wingdings" panose="05000000000000000000" pitchFamily="2" charset="2"/>
+              </a:rPr>
+              <a:t>apache + </a:t>
+            </a:r>
+            <a:r>
+              <a:rPr lang="en-US" altLang="ko-KR" sz="1300" dirty="0" err="1" smtClean="0">
+                <a:ln>
+                  <a:solidFill>
+                    <a:schemeClr val="tx1">
+                      <a:alpha val="29000"/>
+                    </a:schemeClr>
+                  </a:solidFill>
+                </a:ln>
+                <a:latin typeface="+mn-ea"/>
+                <a:cs typeface="맑은 고딕 Semilight" panose="020B0502040204020203" pitchFamily="50" charset="-127"/>
+                <a:sym typeface="Wingdings" panose="05000000000000000000" pitchFamily="2" charset="2"/>
+              </a:rPr>
+              <a:t>mysql</a:t>
+            </a:r>
+            <a:r>
+              <a:rPr lang="en-US" altLang="ko-KR" sz="1300" dirty="0" smtClean="0">
+                <a:ln>
+                  <a:solidFill>
+                    <a:schemeClr val="tx1">
+                      <a:alpha val="29000"/>
+                    </a:schemeClr>
+                  </a:solidFill>
+                </a:ln>
+                <a:latin typeface="+mn-ea"/>
+                <a:cs typeface="맑은 고딕 Semilight" panose="020B0502040204020203" pitchFamily="50" charset="-127"/>
+                <a:sym typeface="Wingdings" panose="05000000000000000000" pitchFamily="2" charset="2"/>
+              </a:rPr>
+              <a:t> server </a:t>
+            </a:r>
+            <a:r>
+              <a:rPr lang="ko-KR" altLang="en-US" sz="1300" dirty="0" smtClean="0">
+                <a:ln>
+                  <a:solidFill>
+                    <a:schemeClr val="tx1">
+                      <a:alpha val="29000"/>
+                    </a:schemeClr>
+                  </a:solidFill>
+                </a:ln>
+                <a:latin typeface="+mn-ea"/>
+                <a:cs typeface="맑은 고딕 Semilight" panose="020B0502040204020203" pitchFamily="50" charset="-127"/>
+                <a:sym typeface="Wingdings" panose="05000000000000000000" pitchFamily="2" charset="2"/>
+              </a:rPr>
+              <a:t>방화벽을 허용</a:t>
+            </a:r>
+            <a:r>
+              <a:rPr lang="en-US" altLang="ko-KR" sz="1300" dirty="0" smtClean="0">
+                <a:ln>
+                  <a:solidFill>
+                    <a:schemeClr val="tx1">
+                      <a:alpha val="29000"/>
+                    </a:schemeClr>
+                  </a:solidFill>
+                </a:ln>
+                <a:latin typeface="+mn-ea"/>
+                <a:cs typeface="맑은 고딕 Semilight" panose="020B0502040204020203" pitchFamily="50" charset="-127"/>
+                <a:sym typeface="Wingdings" panose="05000000000000000000" pitchFamily="2" charset="2"/>
+              </a:rPr>
+              <a:t>!</a:t>
+            </a:r>
+            <a:endParaRPr lang="ko-KR" altLang="en-US" sz="1300" dirty="0"/>
+          </a:p>
+        </p:txBody>
+      </p:sp>
+    </p:spTree>
+    <p:extLst>
+      <p:ext uri="{BB962C8B-B14F-4D97-AF65-F5344CB8AC3E}">
+        <p14:creationId xmlns:p14="http://schemas.microsoft.com/office/powerpoint/2010/main" val="1908372754"/>
+      </p:ext>
+    </p:extLst>
+  </p:cSld>
+  <p:clrMapOvr>
+    <a:masterClrMapping/>
+  </p:clrMapOvr>
+  <p:timing>
+    <p:tnLst>
+      <p:par>
+        <p:cTn id="1" dur="indefinite" restart="never" nodeType="tmRoot"/>
+      </p:par>
+    </p:tnLst>
+  </p:timing>
+</p:sld>
+</file>
+
 <file path=ppt/slides/slide3.xml><?xml version="1.0" encoding="utf-8"?>
 <p:sld xmlns:a="http://schemas.openxmlformats.org/drawingml/2006/main" xmlns:r="http://schemas.openxmlformats.org/officeDocument/2006/relationships" xmlns:p="http://schemas.openxmlformats.org/presentationml/2006/main">
   <p:cSld>
@@ -12570,14 +13136,14 @@
                 <a:gridCol w="1362454">
                   <a:extLst>
                     <a:ext uri="{9D8B030D-6E8A-4147-A177-3AD203B41FA5}">
-                      <a16:colId xmlns:a16="http://schemas.microsoft.com/office/drawing/2014/main" xmlns="" val="2709668098"/>
+                      <a16:colId xmlns:a16="http://schemas.microsoft.com/office/drawing/2014/main" val="2709668098"/>
                     </a:ext>
                   </a:extLst>
                 </a:gridCol>
                 <a:gridCol w="4300053">
                   <a:extLst>
                     <a:ext uri="{9D8B030D-6E8A-4147-A177-3AD203B41FA5}">
-                      <a16:colId xmlns:a16="http://schemas.microsoft.com/office/drawing/2014/main" xmlns="" val="2216287910"/>
+                      <a16:colId xmlns:a16="http://schemas.microsoft.com/office/drawing/2014/main" val="2216287910"/>
                     </a:ext>
                   </a:extLst>
                 </a:gridCol>
@@ -12747,7 +13313,7 @@
                 </a:tc>
                 <a:extLst>
                   <a:ext uri="{0D108BD9-81ED-4DB2-BD59-A6C34878D82A}">
-                    <a16:rowId xmlns:a16="http://schemas.microsoft.com/office/drawing/2014/main" xmlns="" val="446565953"/>
+                    <a16:rowId xmlns:a16="http://schemas.microsoft.com/office/drawing/2014/main" val="446565953"/>
                   </a:ext>
                 </a:extLst>
               </a:tr>
@@ -12952,7 +13518,7 @@
                 </a:tc>
                 <a:extLst>
                   <a:ext uri="{0D108BD9-81ED-4DB2-BD59-A6C34878D82A}">
-                    <a16:rowId xmlns:a16="http://schemas.microsoft.com/office/drawing/2014/main" xmlns="" val="2931184708"/>
+                    <a16:rowId xmlns:a16="http://schemas.microsoft.com/office/drawing/2014/main" val="2931184708"/>
                   </a:ext>
                 </a:extLst>
               </a:tr>
@@ -13121,7 +13687,7 @@
                 </a:tc>
                 <a:extLst>
                   <a:ext uri="{0D108BD9-81ED-4DB2-BD59-A6C34878D82A}">
-                    <a16:rowId xmlns:a16="http://schemas.microsoft.com/office/drawing/2014/main" xmlns="" val="1531042668"/>
+                    <a16:rowId xmlns:a16="http://schemas.microsoft.com/office/drawing/2014/main" val="1531042668"/>
                   </a:ext>
                 </a:extLst>
               </a:tr>
@@ -13432,14 +13998,14 @@
                 <a:gridCol w="2018713">
                   <a:extLst>
                     <a:ext uri="{9D8B030D-6E8A-4147-A177-3AD203B41FA5}">
-                      <a16:colId xmlns:a16="http://schemas.microsoft.com/office/drawing/2014/main" xmlns="" val="2709668098"/>
+                      <a16:colId xmlns:a16="http://schemas.microsoft.com/office/drawing/2014/main" val="2709668098"/>
                     </a:ext>
                   </a:extLst>
                 </a:gridCol>
                 <a:gridCol w="6371277">
                   <a:extLst>
                     <a:ext uri="{9D8B030D-6E8A-4147-A177-3AD203B41FA5}">
-                      <a16:colId xmlns:a16="http://schemas.microsoft.com/office/drawing/2014/main" xmlns="" val="2216287910"/>
+                      <a16:colId xmlns:a16="http://schemas.microsoft.com/office/drawing/2014/main" val="2216287910"/>
                     </a:ext>
                   </a:extLst>
                 </a:gridCol>
@@ -13579,7 +14145,7 @@
                 </a:tc>
                 <a:extLst>
                   <a:ext uri="{0D108BD9-81ED-4DB2-BD59-A6C34878D82A}">
-                    <a16:rowId xmlns:a16="http://schemas.microsoft.com/office/drawing/2014/main" xmlns="" val="446565953"/>
+                    <a16:rowId xmlns:a16="http://schemas.microsoft.com/office/drawing/2014/main" val="446565953"/>
                   </a:ext>
                 </a:extLst>
               </a:tr>
@@ -13916,7 +14482,7 @@
                 </a:tc>
                 <a:extLst>
                   <a:ext uri="{0D108BD9-81ED-4DB2-BD59-A6C34878D82A}">
-                    <a16:rowId xmlns:a16="http://schemas.microsoft.com/office/drawing/2014/main" xmlns="" val="2931184708"/>
+                    <a16:rowId xmlns:a16="http://schemas.microsoft.com/office/drawing/2014/main" val="2931184708"/>
                   </a:ext>
                 </a:extLst>
               </a:tr>
@@ -14109,7 +14675,7 @@
                 </a:tc>
                 <a:extLst>
                   <a:ext uri="{0D108BD9-81ED-4DB2-BD59-A6C34878D82A}">
-                    <a16:rowId xmlns:a16="http://schemas.microsoft.com/office/drawing/2014/main" xmlns="" val="1531042668"/>
+                    <a16:rowId xmlns:a16="http://schemas.microsoft.com/office/drawing/2014/main" val="1531042668"/>
                   </a:ext>
                 </a:extLst>
               </a:tr>
@@ -14266,7 +14832,7 @@
                 </a:tc>
                 <a:extLst>
                   <a:ext uri="{0D108BD9-81ED-4DB2-BD59-A6C34878D82A}">
-                    <a16:rowId xmlns:a16="http://schemas.microsoft.com/office/drawing/2014/main" xmlns="" val="3139032540"/>
+                    <a16:rowId xmlns:a16="http://schemas.microsoft.com/office/drawing/2014/main" val="3139032540"/>
                   </a:ext>
                 </a:extLst>
               </a:tr>
@@ -14459,7 +15025,7 @@
                 </a:tc>
                 <a:extLst>
                   <a:ext uri="{0D108BD9-81ED-4DB2-BD59-A6C34878D82A}">
-                    <a16:rowId xmlns:a16="http://schemas.microsoft.com/office/drawing/2014/main" xmlns="" val="2869080738"/>
+                    <a16:rowId xmlns:a16="http://schemas.microsoft.com/office/drawing/2014/main" val="2869080738"/>
                   </a:ext>
                 </a:extLst>
               </a:tr>
@@ -14688,7 +15254,7 @@
                 </a:tc>
                 <a:extLst>
                   <a:ext uri="{0D108BD9-81ED-4DB2-BD59-A6C34878D82A}">
-                    <a16:rowId xmlns:a16="http://schemas.microsoft.com/office/drawing/2014/main" xmlns="" val="1974004716"/>
+                    <a16:rowId xmlns:a16="http://schemas.microsoft.com/office/drawing/2014/main" val="1974004716"/>
                   </a:ext>
                 </a:extLst>
               </a:tr>
@@ -16232,7 +16798,7 @@
         </p:blipFill>
         <p:spPr bwMode="auto">
           <a:xfrm>
-            <a:off x="1003300" y="2581275"/>
+            <a:off x="1003300" y="2264227"/>
             <a:ext cx="8153400" cy="1047750"/>
           </a:xfrm>
           <a:prstGeom prst="rect">
@@ -16271,6 +16837,30 @@
               </a14:hiddenEffects>
             </a:ext>
           </a:extLst>
+        </p:spPr>
+      </p:pic>
+      <p:pic>
+        <p:nvPicPr>
+          <p:cNvPr id="2" name="그림 1"/>
+          <p:cNvPicPr>
+            <a:picLocks noChangeAspect="1"/>
+          </p:cNvPicPr>
+          <p:nvPr/>
+        </p:nvPicPr>
+        <p:blipFill>
+          <a:blip r:embed="rId4"/>
+          <a:stretch>
+            <a:fillRect/>
+          </a:stretch>
+        </p:blipFill>
+        <p:spPr>
+          <a:xfrm>
+            <a:off x="2312987" y="3397281"/>
+            <a:ext cx="5534025" cy="1619250"/>
+          </a:xfrm>
+          <a:prstGeom prst="rect">
+            <a:avLst/>
+          </a:prstGeom>
         </p:spPr>
       </p:pic>
     </p:spTree>
@@ -17047,37 +17637,7 @@
                 <a:cs typeface="맑은 고딕 Semilight" panose="020B0502040204020203" pitchFamily="50" charset="-127"/>
                 <a:sym typeface="Wingdings" panose="05000000000000000000" pitchFamily="2" charset="2"/>
               </a:rPr>
-              <a:t>.</a:t>
-            </a:r>
-            <a:r>
-              <a:rPr lang="en-US" altLang="ko-KR" sz="1400" dirty="0" smtClean="0">
-                <a:ln>
-                  <a:solidFill>
-                    <a:schemeClr val="tx1">
-                      <a:alpha val="29000"/>
-                    </a:schemeClr>
-                  </a:solidFill>
-                </a:ln>
-                <a:latin typeface="+mn-ea"/>
-                <a:cs typeface="맑은 고딕 Semilight" panose="020B0502040204020203" pitchFamily="50" charset="-127"/>
-                <a:sym typeface="Wingdings" panose="05000000000000000000" pitchFamily="2" charset="2"/>
-              </a:rPr>
-              <a:t>html</a:t>
-            </a:r>
-            <a:r>
-              <a:rPr lang="en-US" altLang="ko-KR" sz="1400" dirty="0" smtClean="0">
-                <a:ln>
-                  <a:solidFill>
-                    <a:schemeClr val="tx1">
-                      <a:alpha val="29000"/>
-                    </a:schemeClr>
-                  </a:solidFill>
-                </a:ln>
-                <a:latin typeface="+mn-ea"/>
-                <a:cs typeface="맑은 고딕 Semilight" panose="020B0502040204020203" pitchFamily="50" charset="-127"/>
-                <a:sym typeface="Wingdings" panose="05000000000000000000" pitchFamily="2" charset="2"/>
-              </a:rPr>
-              <a:t> </a:t>
+              <a:t>.html </a:t>
             </a:r>
             <a:r>
               <a:rPr lang="ko-KR" altLang="en-US" sz="1400" dirty="0" smtClean="0">
@@ -17151,22 +17711,7 @@
                 <a:cs typeface="맑은 고딕 Semilight" panose="020B0502040204020203" pitchFamily="50" charset="-127"/>
                 <a:sym typeface="Wingdings" panose="05000000000000000000" pitchFamily="2" charset="2"/>
               </a:rPr>
-              <a:t>파일을 생성하고 </a:t>
-            </a:r>
-            <a:r>
-              <a:rPr lang="ko-KR" altLang="en-US" sz="1400" dirty="0" smtClean="0">
-                <a:ln>
-                  <a:solidFill>
-                    <a:schemeClr val="tx1">
-                      <a:alpha val="29000"/>
-                    </a:schemeClr>
-                  </a:solidFill>
-                </a:ln>
-                <a:latin typeface="+mn-ea"/>
-                <a:cs typeface="맑은 고딕 Semilight" panose="020B0502040204020203" pitchFamily="50" charset="-127"/>
-                <a:sym typeface="Wingdings" panose="05000000000000000000" pitchFamily="2" charset="2"/>
-              </a:rPr>
-              <a:t>파일에 </a:t>
+              <a:t>파일을 생성하고 파일에 </a:t>
             </a:r>
             <a:r>
               <a:rPr lang="en-US" altLang="ko-KR" sz="1400" dirty="0" smtClean="0">
@@ -17550,7 +18095,7 @@
   <a:extraClrSchemeLst/>
   <a:extLst>
     <a:ext uri="{05A4C25C-085E-4340-85A3-A5531E510DB2}">
-      <thm15:themeFamily xmlns:thm15="http://schemas.microsoft.com/office/thememl/2012/main" xmlns="" name="Office Theme" id="{62F939B6-93AF-4DB8-9C6B-D6C7DFDC589F}" vid="{4A3C46E8-61CC-4603-A589-7422A47A8E4A}"/>
+      <thm15:themeFamily xmlns:thm15="http://schemas.microsoft.com/office/thememl/2012/main" name="Office Theme" id="{62F939B6-93AF-4DB8-9C6B-D6C7DFDC589F}" vid="{4A3C46E8-61CC-4603-A589-7422A47A8E4A}"/>
     </a:ext>
   </a:extLst>
 </a:theme>
@@ -17811,7 +18356,7 @@
   <a:extraClrSchemeLst/>
   <a:extLst>
     <a:ext uri="{05A4C25C-085E-4340-85A3-A5531E510DB2}">
-      <thm15:themeFamily xmlns:thm15="http://schemas.microsoft.com/office/thememl/2012/main" xmlns="" name="Office Theme" id="{62F939B6-93AF-4DB8-9C6B-D6C7DFDC589F}" vid="{4A3C46E8-61CC-4603-A589-7422A47A8E4A}"/>
+      <thm15:themeFamily xmlns:thm15="http://schemas.microsoft.com/office/thememl/2012/main" name="Office Theme" id="{62F939B6-93AF-4DB8-9C6B-D6C7DFDC589F}" vid="{4A3C46E8-61CC-4603-A589-7422A47A8E4A}"/>
     </a:ext>
   </a:extLst>
 </a:theme>
@@ -18072,7 +18617,7 @@
   <a:extraClrSchemeLst/>
   <a:extLst>
     <a:ext uri="{05A4C25C-085E-4340-85A3-A5531E510DB2}">
-      <thm15:themeFamily xmlns:thm15="http://schemas.microsoft.com/office/thememl/2012/main" xmlns="" name="Office Theme" id="{62F939B6-93AF-4DB8-9C6B-D6C7DFDC589F}" vid="{4A3C46E8-61CC-4603-A589-7422A47A8E4A}"/>
+      <thm15:themeFamily xmlns:thm15="http://schemas.microsoft.com/office/thememl/2012/main" name="Office Theme" id="{62F939B6-93AF-4DB8-9C6B-D6C7DFDC589F}" vid="{4A3C46E8-61CC-4603-A589-7422A47A8E4A}"/>
     </a:ext>
   </a:extLst>
 </a:theme>

</xml_diff>